<commit_message>
docs: Schreibfehler bei der Architektur korrigiert
Refs: SCP-75, SCP-76
Time: 0.1 h
</commit_message>
<xml_diff>
--- a/Dokumente/Architektur/Projekt Architektur.pptx
+++ b/Dokumente/Architektur/Projekt Architektur.pptx
@@ -6,7 +6,7 @@
   </p:sldMasterIdLst>
   <p:sldIdLst>
     <p:sldId id="256" r:id="rId2"/>
-    <p:sldId id="257" r:id="rId3"/>
+    <p:sldId id="258" r:id="rId3"/>
   </p:sldIdLst>
   <p:sldSz cx="12192000" cy="6858000"/>
   <p:notesSz cx="6858000" cy="9144000"/>
@@ -113,14 +113,95 @@
 </p:presentation>
 </file>
 
-<file path=ppt/revisionInfo.xml><?xml version="1.0" encoding="utf-8"?>
-<p1510:revInfo xmlns:a="http://schemas.openxmlformats.org/drawingml/2006/main" xmlns:r="http://schemas.openxmlformats.org/officeDocument/2006/relationships" xmlns:p1510="http://schemas.microsoft.com/office/powerpoint/2015/10/main">
-  <p1510:revLst>
-    <p1510:client id="{1C27E6DD-B0EE-4D5B-9689-3721B217DF72}" v="13" dt="2023-04-05T20:53:14.785"/>
-    <p1510:client id="{8191A4C5-BF8E-42D3-B89D-CF41C464C548}" v="2" dt="2023-04-05T20:59:46.825"/>
-    <p1510:client id="{DAAF5114-C782-4659-98AA-A1C60C8A865F}" v="95" dt="2023-04-06T08:08:14.316"/>
-  </p1510:revLst>
-</p1510:revInfo>
+<file path=ppt/changesInfos/changesInfo1.xml><?xml version="1.0" encoding="utf-8"?>
+<pc:chgInfo xmlns:a="http://schemas.openxmlformats.org/drawingml/2006/main" xmlns:r="http://schemas.openxmlformats.org/officeDocument/2006/relationships" xmlns:ac="http://schemas.microsoft.com/office/drawing/2013/main/command" xmlns:pc="http://schemas.microsoft.com/office/powerpoint/2013/main/command">
+  <pc:docChgLst>
+    <pc:chgData name="Jason Duffy" userId="96d836a7-e137-45ee-93ec-e5d8e4b16da5" providerId="ADAL" clId="{26BAA392-B84E-403B-B7CA-C1D6BD79A3E7}"/>
+    <pc:docChg chg="addSld delSld modSld">
+      <pc:chgData name="Jason Duffy" userId="96d836a7-e137-45ee-93ec-e5d8e4b16da5" providerId="ADAL" clId="{26BAA392-B84E-403B-B7CA-C1D6BD79A3E7}" dt="2023-04-12T14:34:34.973" v="55" actId="2696"/>
+      <pc:docMkLst>
+        <pc:docMk/>
+      </pc:docMkLst>
+      <pc:sldChg chg="modSp mod">
+        <pc:chgData name="Jason Duffy" userId="96d836a7-e137-45ee-93ec-e5d8e4b16da5" providerId="ADAL" clId="{26BAA392-B84E-403B-B7CA-C1D6BD79A3E7}" dt="2023-04-12T14:33:58.105" v="19" actId="1037"/>
+        <pc:sldMkLst>
+          <pc:docMk/>
+          <pc:sldMk cId="2050808403" sldId="256"/>
+        </pc:sldMkLst>
+        <pc:spChg chg="mod">
+          <ac:chgData name="Jason Duffy" userId="96d836a7-e137-45ee-93ec-e5d8e4b16da5" providerId="ADAL" clId="{26BAA392-B84E-403B-B7CA-C1D6BD79A3E7}" dt="2023-04-12T14:33:49.918" v="12" actId="688"/>
+          <ac:spMkLst>
+            <pc:docMk/>
+            <pc:sldMk cId="2050808403" sldId="256"/>
+            <ac:spMk id="27" creationId="{2D687419-71F5-EBB8-D0EF-0DCFEDC49DC0}"/>
+          </ac:spMkLst>
+        </pc:spChg>
+        <pc:spChg chg="mod">
+          <ac:chgData name="Jason Duffy" userId="96d836a7-e137-45ee-93ec-e5d8e4b16da5" providerId="ADAL" clId="{26BAA392-B84E-403B-B7CA-C1D6BD79A3E7}" dt="2023-04-12T14:33:58.105" v="19" actId="1037"/>
+          <ac:spMkLst>
+            <pc:docMk/>
+            <pc:sldMk cId="2050808403" sldId="256"/>
+            <ac:spMk id="28" creationId="{F91528C1-8FAF-74E6-FB04-1A82A9BDE7EC}"/>
+          </ac:spMkLst>
+        </pc:spChg>
+      </pc:sldChg>
+      <pc:sldChg chg="modSp del mod">
+        <pc:chgData name="Jason Duffy" userId="96d836a7-e137-45ee-93ec-e5d8e4b16da5" providerId="ADAL" clId="{26BAA392-B84E-403B-B7CA-C1D6BD79A3E7}" dt="2023-04-12T14:34:34.973" v="55" actId="2696"/>
+        <pc:sldMkLst>
+          <pc:docMk/>
+          <pc:sldMk cId="4095158670" sldId="257"/>
+        </pc:sldMkLst>
+        <pc:spChg chg="mod">
+          <ac:chgData name="Jason Duffy" userId="96d836a7-e137-45ee-93ec-e5d8e4b16da5" providerId="ADAL" clId="{26BAA392-B84E-403B-B7CA-C1D6BD79A3E7}" dt="2023-04-12T14:29:05.500" v="1" actId="20577"/>
+          <ac:spMkLst>
+            <pc:docMk/>
+            <pc:sldMk cId="4095158670" sldId="257"/>
+            <ac:spMk id="7" creationId="{765ADD95-7D02-28D2-2525-67459C03497E}"/>
+          </ac:spMkLst>
+        </pc:spChg>
+      </pc:sldChg>
+      <pc:sldChg chg="modSp add mod">
+        <pc:chgData name="Jason Duffy" userId="96d836a7-e137-45ee-93ec-e5d8e4b16da5" providerId="ADAL" clId="{26BAA392-B84E-403B-B7CA-C1D6BD79A3E7}" dt="2023-04-12T14:34:27.173" v="54" actId="20577"/>
+        <pc:sldMkLst>
+          <pc:docMk/>
+          <pc:sldMk cId="2780680337" sldId="258"/>
+        </pc:sldMkLst>
+        <pc:spChg chg="mod">
+          <ac:chgData name="Jason Duffy" userId="96d836a7-e137-45ee-93ec-e5d8e4b16da5" providerId="ADAL" clId="{26BAA392-B84E-403B-B7CA-C1D6BD79A3E7}" dt="2023-04-12T14:34:19.516" v="33" actId="20577"/>
+          <ac:spMkLst>
+            <pc:docMk/>
+            <pc:sldMk cId="2780680337" sldId="258"/>
+            <ac:spMk id="5" creationId="{CAC5EEE2-B7AB-FD1E-878C-4711EE9B71C3}"/>
+          </ac:spMkLst>
+        </pc:spChg>
+        <pc:spChg chg="mod">
+          <ac:chgData name="Jason Duffy" userId="96d836a7-e137-45ee-93ec-e5d8e4b16da5" providerId="ADAL" clId="{26BAA392-B84E-403B-B7CA-C1D6BD79A3E7}" dt="2023-04-12T14:34:23.093" v="44" actId="20577"/>
+          <ac:spMkLst>
+            <pc:docMk/>
+            <pc:sldMk cId="2780680337" sldId="258"/>
+            <ac:spMk id="7" creationId="{765ADD95-7D02-28D2-2525-67459C03497E}"/>
+          </ac:spMkLst>
+        </pc:spChg>
+        <pc:spChg chg="mod">
+          <ac:chgData name="Jason Duffy" userId="96d836a7-e137-45ee-93ec-e5d8e4b16da5" providerId="ADAL" clId="{26BAA392-B84E-403B-B7CA-C1D6BD79A3E7}" dt="2023-04-12T14:34:27.173" v="54" actId="20577"/>
+          <ac:spMkLst>
+            <pc:docMk/>
+            <pc:sldMk cId="2780680337" sldId="258"/>
+            <ac:spMk id="8" creationId="{8117D9E4-8CAF-DD53-B29C-F529A3BBB72C}"/>
+          </ac:spMkLst>
+        </pc:spChg>
+        <pc:spChg chg="mod">
+          <ac:chgData name="Jason Duffy" userId="96d836a7-e137-45ee-93ec-e5d8e4b16da5" providerId="ADAL" clId="{26BAA392-B84E-403B-B7CA-C1D6BD79A3E7}" dt="2023-04-12T14:34:16.308" v="28" actId="20577"/>
+          <ac:spMkLst>
+            <pc:docMk/>
+            <pc:sldMk cId="2780680337" sldId="258"/>
+            <ac:spMk id="9" creationId="{B6F9E581-999C-9FBA-3B17-EE195EB8503A}"/>
+          </ac:spMkLst>
+        </pc:spChg>
+      </pc:sldChg>
+    </pc:docChg>
+  </pc:docChgLst>
+</pc:chgInfo>
 </file>
 
 <file path=ppt/slideLayouts/slideLayout1.xml><?xml version="1.0" encoding="utf-8"?>
@@ -1532,7 +1613,7 @@
           <a:p>
             <a:fld id="{F404DC88-3645-4895-A574-B2406CAAA815}" type="datetimeFigureOut">
               <a:rPr lang="de-DE" smtClean="0"/>
-              <a:t>06.04.2023</a:t>
+              <a:t>12.04.2023</a:t>
             </a:fld>
             <a:endParaRPr lang="de-DE"/>
           </a:p>
@@ -2991,7 +3072,7 @@
           <a:p>
             <a:fld id="{F404DC88-3645-4895-A574-B2406CAAA815}" type="datetimeFigureOut">
               <a:rPr lang="de-DE" smtClean="0"/>
-              <a:t>06.04.2023</a:t>
+              <a:t>12.04.2023</a:t>
             </a:fld>
             <a:endParaRPr lang="de-DE"/>
           </a:p>
@@ -4444,7 +4525,7 @@
           <a:p>
             <a:fld id="{F404DC88-3645-4895-A574-B2406CAAA815}" type="datetimeFigureOut">
               <a:rPr lang="de-DE" smtClean="0"/>
-              <a:t>06.04.2023</a:t>
+              <a:t>12.04.2023</a:t>
             </a:fld>
             <a:endParaRPr lang="de-DE"/>
           </a:p>
@@ -5899,7 +5980,7 @@
           <a:p>
             <a:fld id="{F404DC88-3645-4895-A574-B2406CAAA815}" type="datetimeFigureOut">
               <a:rPr lang="de-DE" smtClean="0"/>
-              <a:t>06.04.2023</a:t>
+              <a:t>12.04.2023</a:t>
             </a:fld>
             <a:endParaRPr lang="de-DE"/>
           </a:p>
@@ -7407,7 +7488,7 @@
           <a:p>
             <a:fld id="{F404DC88-3645-4895-A574-B2406CAAA815}" type="datetimeFigureOut">
               <a:rPr lang="de-DE" smtClean="0"/>
-              <a:t>06.04.2023</a:t>
+              <a:t>12.04.2023</a:t>
             </a:fld>
             <a:endParaRPr lang="de-DE"/>
           </a:p>
@@ -8928,7 +9009,7 @@
           <a:p>
             <a:fld id="{F404DC88-3645-4895-A574-B2406CAAA815}" type="datetimeFigureOut">
               <a:rPr lang="de-DE" smtClean="0"/>
-              <a:t>06.04.2023</a:t>
+              <a:t>12.04.2023</a:t>
             </a:fld>
             <a:endParaRPr lang="de-DE"/>
           </a:p>
@@ -10593,7 +10674,7 @@
           <a:p>
             <a:fld id="{F404DC88-3645-4895-A574-B2406CAAA815}" type="datetimeFigureOut">
               <a:rPr lang="de-DE" smtClean="0"/>
-              <a:t>06.04.2023</a:t>
+              <a:t>12.04.2023</a:t>
             </a:fld>
             <a:endParaRPr lang="de-DE"/>
           </a:p>
@@ -11991,7 +12072,7 @@
           <a:p>
             <a:fld id="{F404DC88-3645-4895-A574-B2406CAAA815}" type="datetimeFigureOut">
               <a:rPr lang="de-DE" smtClean="0"/>
-              <a:t>06.04.2023</a:t>
+              <a:t>12.04.2023</a:t>
             </a:fld>
             <a:endParaRPr lang="de-DE"/>
           </a:p>
@@ -12091,7 +12172,7 @@
           <a:p>
             <a:fld id="{F404DC88-3645-4895-A574-B2406CAAA815}" type="datetimeFigureOut">
               <a:rPr lang="de-DE" smtClean="0"/>
-              <a:t>06.04.2023</a:t>
+              <a:t>12.04.2023</a:t>
             </a:fld>
             <a:endParaRPr lang="de-DE"/>
           </a:p>
@@ -13617,7 +13698,7 @@
           <a:p>
             <a:fld id="{F404DC88-3645-4895-A574-B2406CAAA815}" type="datetimeFigureOut">
               <a:rPr lang="de-DE" smtClean="0"/>
-              <a:t>06.04.2023</a:t>
+              <a:t>12.04.2023</a:t>
             </a:fld>
             <a:endParaRPr lang="de-DE"/>
           </a:p>
@@ -15153,7 +15234,7 @@
           <a:p>
             <a:fld id="{F404DC88-3645-4895-A574-B2406CAAA815}" type="datetimeFigureOut">
               <a:rPr lang="de-DE" smtClean="0"/>
-              <a:t>06.04.2023</a:t>
+              <a:t>12.04.2023</a:t>
             </a:fld>
             <a:endParaRPr lang="de-DE"/>
           </a:p>
@@ -15376,7 +15457,7 @@
           <a:p>
             <a:fld id="{F404DC88-3645-4895-A574-B2406CAAA815}" type="datetimeFigureOut">
               <a:rPr lang="de-DE" smtClean="0"/>
-              <a:t>06.04.2023</a:t>
+              <a:t>12.04.2023</a:t>
             </a:fld>
             <a:endParaRPr lang="de-DE"/>
           </a:p>
@@ -16004,8 +16085,8 @@
           <p:nvPr/>
         </p:nvSpPr>
         <p:spPr>
-          <a:xfrm rot="2131619">
-            <a:off x="5693511" y="1152675"/>
+          <a:xfrm rot="2100948">
+            <a:off x="5620264" y="1048520"/>
             <a:ext cx="953723" cy="446276"/>
           </a:xfrm>
           <a:prstGeom prst="rect">
@@ -16042,7 +16123,7 @@
         </p:nvSpPr>
         <p:spPr>
           <a:xfrm rot="19500000">
-            <a:off x="5578632" y="2841525"/>
+            <a:off x="5643044" y="2846957"/>
             <a:ext cx="953723" cy="446276"/>
           </a:xfrm>
           <a:prstGeom prst="rect">
@@ -16508,8 +16589,8 @@
           <p:nvPr/>
         </p:nvSpPr>
         <p:spPr>
-          <a:xfrm rot="2109703">
-            <a:off x="5693511" y="1177658"/>
+          <a:xfrm rot="2100948">
+            <a:off x="5620264" y="1048520"/>
             <a:ext cx="953723" cy="446276"/>
           </a:xfrm>
           <a:prstGeom prst="rect">
@@ -16529,9 +16610,6 @@
               </a:rPr>
               <a:t>SAML</a:t>
             </a:r>
-            <a:endParaRPr lang="de-DE" sz="2300" dirty="0">
-              <a:latin typeface="Helvetica Light" panose="020B0500000000000000" pitchFamily="34" charset="0"/>
-            </a:endParaRPr>
           </a:p>
         </p:txBody>
       </p:sp>
@@ -16549,8 +16627,8 @@
         </p:nvSpPr>
         <p:spPr>
           <a:xfrm rot="19500000">
-            <a:off x="5624321" y="2879997"/>
-            <a:ext cx="1019253" cy="477054"/>
+            <a:off x="5643044" y="2846957"/>
+            <a:ext cx="953723" cy="446276"/>
           </a:xfrm>
           <a:prstGeom prst="rect">
             <a:avLst/>
@@ -16564,12 +16642,12 @@
           <a:lstStyle/>
           <a:p>
             <a:r>
-              <a:rPr lang="de-DE" sz="2500" dirty="0">
+              <a:rPr lang="de-DE" sz="2300" dirty="0">
                 <a:latin typeface="Helvetica Light"/>
               </a:rPr>
               <a:t>SAML</a:t>
             </a:r>
-            <a:endParaRPr lang="de-DE" sz="2500" dirty="0">
+            <a:endParaRPr lang="de-DE" dirty="0">
               <a:latin typeface="Helvetica Light" panose="020B0500000000000000" pitchFamily="34" charset="0"/>
             </a:endParaRPr>
           </a:p>
@@ -16653,11 +16731,14 @@
           <a:p>
             <a:pPr algn="ctr"/>
             <a:r>
-              <a:rPr lang="de-DE" sz="3000" dirty="0">
+              <a:rPr lang="de-DE" sz="3000" dirty="0" err="1">
                 <a:latin typeface="Helvetica Light"/>
               </a:rPr>
               <a:t>React</a:t>
             </a:r>
+            <a:endParaRPr lang="de-DE" sz="3000" dirty="0">
+              <a:latin typeface="Helvetica Light"/>
+            </a:endParaRPr>
           </a:p>
         </p:txBody>
       </p:sp>
@@ -16705,7 +16786,7 @@
               <a:rPr lang="de-DE" sz="3000" dirty="0">
                 <a:latin typeface="Helvetica Light"/>
               </a:rPr>
-              <a:t>Sprint Boot</a:t>
+              <a:t>Spring Boot</a:t>
             </a:r>
           </a:p>
         </p:txBody>
@@ -16756,9 +16837,6 @@
               </a:rPr>
               <a:t>PostgreSQL</a:t>
             </a:r>
-            <a:endParaRPr lang="de-DE" sz="3000">
-              <a:latin typeface="Helvetica Light" panose="020B0500000000000000" pitchFamily="34" charset="0"/>
-            </a:endParaRPr>
           </a:p>
         </p:txBody>
       </p:sp>
@@ -16803,18 +16881,21 @@
           <a:p>
             <a:pPr algn="ctr"/>
             <a:r>
-              <a:rPr lang="de-DE" sz="3000" dirty="0">
+              <a:rPr lang="de-DE" sz="3000" dirty="0" err="1">
                 <a:latin typeface="Helvetica Light"/>
               </a:rPr>
               <a:t>Keycloak</a:t>
             </a:r>
+            <a:endParaRPr lang="de-DE" sz="3000" dirty="0">
+              <a:latin typeface="Helvetica Light"/>
+            </a:endParaRPr>
           </a:p>
         </p:txBody>
       </p:sp>
     </p:spTree>
     <p:extLst>
       <p:ext uri="{BB962C8B-B14F-4D97-AF65-F5344CB8AC3E}">
-        <p14:creationId xmlns:p14="http://schemas.microsoft.com/office/powerpoint/2010/main" val="4095158670"/>
+        <p14:creationId xmlns:p14="http://schemas.microsoft.com/office/powerpoint/2010/main" val="2780680337"/>
       </p:ext>
     </p:extLst>
   </p:cSld>

</xml_diff>